<commit_message>
Projet a importer sur vos environnements
Projet a importer sur vos environnements
</commit_message>
<xml_diff>
--- a/Documents/Ma Moyenne.pptx
+++ b/Documents/Ma Moyenne.pptx
@@ -119,6 +119,22 @@
       </a:defRPr>
     </a:lvl9pPr>
   </p:defaultTextStyle>
+  <p:extLst>
+    <p:ext uri="{EFAFB233-063F-42B5-8137-9DF3F51BA10A}">
+      <p15:sldGuideLst xmlns:p15="http://schemas.microsoft.com/office/powerpoint/2012/main">
+        <p15:guide id="1" orient="horz" pos="2160">
+          <p15:clr>
+            <a:srgbClr val="A4A3A4"/>
+          </p15:clr>
+        </p15:guide>
+        <p15:guide id="2" pos="2880">
+          <p15:clr>
+            <a:srgbClr val="A4A3A4"/>
+          </p15:clr>
+        </p15:guide>
+      </p15:sldGuideLst>
+    </p:ext>
+  </p:extLst>
 </p:presentation>
 </file>
 
@@ -204,7 +220,7 @@
           <a:p>
             <a:fld id="{50221CF5-FB91-4118-857B-502539052A53}" type="datetimeFigureOut">
               <a:rPr lang="fr-FR" smtClean="0"/>
-              <a:t>26/01/2015</a:t>
+              <a:t>27/01/2015</a:t>
             </a:fld>
             <a:endParaRPr lang="fr-FR"/>
           </a:p>
@@ -766,7 +782,7 @@
           <a:p>
             <a:fld id="{FC3410D3-3D1E-4FC7-958A-85E8D497938F}" type="datetimeFigureOut">
               <a:rPr lang="fr-FR" smtClean="0"/>
-              <a:t>26/01/2015</a:t>
+              <a:t>27/01/2015</a:t>
             </a:fld>
             <a:endParaRPr lang="fr-FR"/>
           </a:p>
@@ -952,7 +968,7 @@
           <a:p>
             <a:fld id="{FC3410D3-3D1E-4FC7-958A-85E8D497938F}" type="datetimeFigureOut">
               <a:rPr lang="fr-FR" smtClean="0"/>
-              <a:t>26/01/2015</a:t>
+              <a:t>27/01/2015</a:t>
             </a:fld>
             <a:endParaRPr lang="fr-FR"/>
           </a:p>
@@ -1134,7 +1150,7 @@
           <a:p>
             <a:fld id="{FC3410D3-3D1E-4FC7-958A-85E8D497938F}" type="datetimeFigureOut">
               <a:rPr lang="fr-FR" smtClean="0"/>
-              <a:t>26/01/2015</a:t>
+              <a:t>27/01/2015</a:t>
             </a:fld>
             <a:endParaRPr lang="fr-FR"/>
           </a:p>
@@ -1327,7 +1343,7 @@
           <a:p>
             <a:fld id="{FC3410D3-3D1E-4FC7-958A-85E8D497938F}" type="datetimeFigureOut">
               <a:rPr lang="fr-FR" smtClean="0"/>
-              <a:t>26/01/2015</a:t>
+              <a:t>27/01/2015</a:t>
             </a:fld>
             <a:endParaRPr lang="fr-FR"/>
           </a:p>
@@ -1453,7 +1469,7 @@
           <a:p>
             <a:fld id="{FC3410D3-3D1E-4FC7-958A-85E8D497938F}" type="datetimeFigureOut">
               <a:rPr lang="fr-FR" smtClean="0"/>
-              <a:t>26/01/2015</a:t>
+              <a:t>27/01/2015</a:t>
             </a:fld>
             <a:endParaRPr lang="fr-FR"/>
           </a:p>
@@ -1842,7 +1858,7 @@
           <a:p>
             <a:fld id="{FC3410D3-3D1E-4FC7-958A-85E8D497938F}" type="datetimeFigureOut">
               <a:rPr lang="fr-FR" smtClean="0"/>
-              <a:t>26/01/2015</a:t>
+              <a:t>27/01/2015</a:t>
             </a:fld>
             <a:endParaRPr lang="fr-FR"/>
           </a:p>
@@ -2287,7 +2303,7 @@
           <a:p>
             <a:fld id="{FC3410D3-3D1E-4FC7-958A-85E8D497938F}" type="datetimeFigureOut">
               <a:rPr lang="fr-FR" smtClean="0"/>
-              <a:t>26/01/2015</a:t>
+              <a:t>27/01/2015</a:t>
             </a:fld>
             <a:endParaRPr lang="fr-FR"/>
           </a:p>
@@ -2412,7 +2428,7 @@
           <a:p>
             <a:fld id="{FC3410D3-3D1E-4FC7-958A-85E8D497938F}" type="datetimeFigureOut">
               <a:rPr lang="fr-FR" smtClean="0"/>
-              <a:t>26/01/2015</a:t>
+              <a:t>27/01/2015</a:t>
             </a:fld>
             <a:endParaRPr lang="fr-FR"/>
           </a:p>
@@ -2509,7 +2525,7 @@
           <a:p>
             <a:fld id="{FC3410D3-3D1E-4FC7-958A-85E8D497938F}" type="datetimeFigureOut">
               <a:rPr lang="fr-FR" smtClean="0"/>
-              <a:t>26/01/2015</a:t>
+              <a:t>27/01/2015</a:t>
             </a:fld>
             <a:endParaRPr lang="fr-FR"/>
           </a:p>
@@ -2800,7 +2816,7 @@
           <a:p>
             <a:fld id="{FC3410D3-3D1E-4FC7-958A-85E8D497938F}" type="datetimeFigureOut">
               <a:rPr lang="fr-FR" smtClean="0"/>
-              <a:t>26/01/2015</a:t>
+              <a:t>27/01/2015</a:t>
             </a:fld>
             <a:endParaRPr lang="fr-FR"/>
           </a:p>
@@ -3069,7 +3085,7 @@
           <a:p>
             <a:fld id="{FC3410D3-3D1E-4FC7-958A-85E8D497938F}" type="datetimeFigureOut">
               <a:rPr lang="fr-FR" smtClean="0"/>
-              <a:t>26/01/2015</a:t>
+              <a:t>27/01/2015</a:t>
             </a:fld>
             <a:endParaRPr lang="fr-FR"/>
           </a:p>
@@ -3351,7 +3367,7 @@
           <a:p>
             <a:fld id="{FC3410D3-3D1E-4FC7-958A-85E8D497938F}" type="datetimeFigureOut">
               <a:rPr lang="fr-FR" smtClean="0"/>
-              <a:t>26/01/2015</a:t>
+              <a:t>27/01/2015</a:t>
             </a:fld>
             <a:endParaRPr lang="fr-FR"/>
           </a:p>
@@ -4335,11 +4351,7 @@
             <a:pPr algn="ctr"/>
             <a:r>
               <a:rPr lang="fr-FR" sz="2000" b="1" dirty="0" smtClean="0"/>
-              <a:t>Saisir </a:t>
-            </a:r>
-            <a:r>
-              <a:rPr lang="fr-FR" sz="2000" b="1" dirty="0" smtClean="0"/>
-              <a:t>un élève</a:t>
+              <a:t>Saisir un élève</a:t>
             </a:r>
             <a:endParaRPr lang="fr-FR" sz="2000" b="1" dirty="0"/>
           </a:p>
@@ -4383,11 +4395,7 @@
             <a:pPr algn="ctr"/>
             <a:r>
               <a:rPr lang="fr-FR" dirty="0" smtClean="0"/>
-              <a:t>Saisir </a:t>
-            </a:r>
-            <a:r>
-              <a:rPr lang="fr-FR" dirty="0" smtClean="0"/>
-              <a:t>le prénom d’un élève</a:t>
+              <a:t>Saisir le prénom d’un élève</a:t>
             </a:r>
             <a:endParaRPr lang="fr-FR" dirty="0"/>
           </a:p>
@@ -7085,11 +7093,7 @@
             </a:r>
             <a:r>
               <a:rPr lang="fr-FR" sz="2800" dirty="0" smtClean="0"/>
-              <a:t> - </a:t>
-            </a:r>
-            <a:r>
-              <a:rPr lang="fr-FR" sz="2800" dirty="0" smtClean="0"/>
-              <a:t>Etudiants</a:t>
+              <a:t> - Etudiants</a:t>
             </a:r>
             <a:endParaRPr lang="fr-FR" sz="2800" dirty="0"/>
           </a:p>
@@ -7529,7 +7533,7 @@
               <a:pPr algn="ctr"/>
               <a:r>
                 <a:rPr lang="fr-FR" sz="2400" b="1" dirty="0" smtClean="0"/>
-                <a:t>OK</a:t>
+                <a:t>Connexion</a:t>
               </a:r>
               <a:endParaRPr lang="fr-FR" b="1" dirty="0"/>
             </a:p>
@@ -7850,8 +7854,8 @@
           <a:p>
             <a:pPr algn="ctr"/>
             <a:r>
-              <a:rPr lang="fr-FR" sz="2400" b="1" dirty="0" smtClean="0"/>
-              <a:t>OK</a:t>
+              <a:rPr lang="fr-FR" sz="2400" b="1" smtClean="0"/>
+              <a:t>Connexion</a:t>
             </a:r>
             <a:endParaRPr lang="fr-FR" b="1" dirty="0"/>
           </a:p>

</xml_diff>